<commit_message>
acpt: add scenario for Plot.categories
</commit_message>
<xml_diff>
--- a/features/steps/test_files/cht-plot-props.pptx
+++ b/features/steps/test_files/cht-plot-props.pptx
@@ -7,6 +7,7 @@
   <p:sldIdLst>
     <p:sldId id="256" r:id="rId2"/>
     <p:sldId id="257" r:id="rId3"/>
+    <p:sldId id="258" r:id="rId4"/>
   </p:sldIdLst>
   <p:sldSz cx="9144000" cy="6858000" type="screen4x3"/>
   <p:notesSz cx="6858000" cy="9144000"/>
@@ -308,11 +309,12 @@
           <c:showPercent val="0"/>
           <c:showBubbleSize val="0"/>
         </c:dLbls>
-        <c:axId val="-2075992296"/>
-        <c:axId val="2078649096"/>
+        <c:gapWidth val="150"/>
+        <c:axId val="2020355544"/>
+        <c:axId val="2109826856"/>
       </c:barChart>
       <c:catAx>
-        <c:axId val="-2075992296"/>
+        <c:axId val="2020355544"/>
         <c:scaling>
           <c:orientation val="minMax"/>
         </c:scaling>
@@ -321,7 +323,7 @@
         <c:majorTickMark val="out"/>
         <c:minorTickMark val="none"/>
         <c:tickLblPos val="nextTo"/>
-        <c:crossAx val="2078649096"/>
+        <c:crossAx val="2109826856"/>
         <c:crosses val="autoZero"/>
         <c:auto val="1"/>
         <c:lblAlgn val="ctr"/>
@@ -329,7 +331,7 @@
         <c:noMultiLvlLbl val="0"/>
       </c:catAx>
       <c:valAx>
-        <c:axId val="2078649096"/>
+        <c:axId val="2109826856"/>
         <c:scaling>
           <c:orientation val="minMax"/>
         </c:scaling>
@@ -340,7 +342,7 @@
         <c:majorTickMark val="out"/>
         <c:minorTickMark val="none"/>
         <c:tickLblPos val="nextTo"/>
-        <c:crossAx val="-2075992296"/>
+        <c:crossAx val="2020355544"/>
         <c:crosses val="autoZero"/>
         <c:crossBetween val="between"/>
       </c:valAx>
@@ -563,11 +565,11 @@
           </c:val>
         </c:ser>
         <c:gapWidth val="300"/>
-        <c:axId val="-2124998264"/>
-        <c:axId val="-2125090984"/>
+        <c:axId val="2070039208"/>
+        <c:axId val="2070042184"/>
       </c:barChart>
       <c:catAx>
-        <c:axId val="-2124998264"/>
+        <c:axId val="2070039208"/>
         <c:scaling>
           <c:orientation val="minMax"/>
         </c:scaling>
@@ -576,7 +578,7 @@
         <c:majorTickMark val="out"/>
         <c:minorTickMark val="none"/>
         <c:tickLblPos val="nextTo"/>
-        <c:crossAx val="-2125090984"/>
+        <c:crossAx val="2070042184"/>
         <c:crosses val="autoZero"/>
         <c:auto val="1"/>
         <c:lblAlgn val="ctr"/>
@@ -584,7 +586,7 @@
         <c:noMultiLvlLbl val="0"/>
       </c:catAx>
       <c:valAx>
-        <c:axId val="-2125090984"/>
+        <c:axId val="2070042184"/>
         <c:scaling>
           <c:orientation val="minMax"/>
         </c:scaling>
@@ -595,7 +597,262 @@
         <c:majorTickMark val="out"/>
         <c:minorTickMark val="none"/>
         <c:tickLblPos val="nextTo"/>
-        <c:crossAx val="-2124998264"/>
+        <c:crossAx val="2070039208"/>
+        <c:crosses val="autoZero"/>
+        <c:crossBetween val="between"/>
+      </c:valAx>
+    </c:plotArea>
+    <c:legend>
+      <c:legendPos val="r"/>
+      <c:layout/>
+      <c:overlay val="0"/>
+    </c:legend>
+    <c:plotVisOnly val="1"/>
+    <c:dispBlanksAs val="gap"/>
+    <c:showDLblsOverMax val="0"/>
+  </c:chart>
+  <c:txPr>
+    <a:bodyPr/>
+    <a:lstStyle/>
+    <a:p>
+      <a:pPr>
+        <a:defRPr sz="1800"/>
+      </a:pPr>
+      <a:endParaRPr lang="en-US"/>
+    </a:p>
+  </c:txPr>
+  <c:externalData r:id="rId1">
+    <c:autoUpdate val="0"/>
+  </c:externalData>
+</c:chartSpace>
+</file>
+
+<file path=ppt/charts/chart3.xml><?xml version="1.0" encoding="utf-8"?>
+<c:chartSpace xmlns:c="http://schemas.openxmlformats.org/drawingml/2006/chart" xmlns:a="http://schemas.openxmlformats.org/drawingml/2006/main" xmlns:r="http://schemas.openxmlformats.org/officeDocument/2006/relationships">
+  <c:date1904 val="0"/>
+  <c:lang val="en-US"/>
+  <c:roundedCorners val="0"/>
+  <mc:AlternateContent xmlns:mc="http://schemas.openxmlformats.org/markup-compatibility/2006">
+    <mc:Choice xmlns:c14="http://schemas.microsoft.com/office/drawing/2007/8/2/chart" Requires="c14">
+      <c14:style val="118"/>
+    </mc:Choice>
+    <mc:Fallback>
+      <c:style val="18"/>
+    </mc:Fallback>
+  </mc:AlternateContent>
+  <c:chart>
+    <c:autoTitleDeleted val="0"/>
+    <c:plotArea>
+      <c:layout/>
+      <c:barChart>
+        <c:barDir val="bar"/>
+        <c:grouping val="clustered"/>
+        <c:varyColors val="0"/>
+        <c:ser>
+          <c:idx val="0"/>
+          <c:order val="0"/>
+          <c:tx>
+            <c:strRef>
+              <c:f>Sheet1!$B$1</c:f>
+              <c:strCache>
+                <c:ptCount val="1"/>
+                <c:pt idx="0">
+                  <c:v>Series 1</c:v>
+                </c:pt>
+              </c:strCache>
+            </c:strRef>
+          </c:tx>
+          <c:invertIfNegative val="0"/>
+          <c:cat>
+            <c:strRef>
+              <c:f>Sheet1!$A$2:$A$4</c:f>
+              <c:strCache>
+                <c:ptCount val="3"/>
+                <c:pt idx="0">
+                  <c:v>Foo</c:v>
+                </c:pt>
+                <c:pt idx="1">
+                  <c:v>Bar</c:v>
+                </c:pt>
+                <c:pt idx="2">
+                  <c:v>Baz</c:v>
+                </c:pt>
+              </c:strCache>
+            </c:strRef>
+          </c:cat>
+          <c:val>
+            <c:numRef>
+              <c:f>Sheet1!$B$2:$B$4</c:f>
+              <c:numCache>
+                <c:formatCode>General</c:formatCode>
+                <c:ptCount val="3"/>
+                <c:pt idx="0">
+                  <c:v>1.2</c:v>
+                </c:pt>
+                <c:pt idx="1">
+                  <c:v>2.3</c:v>
+                </c:pt>
+                <c:pt idx="2">
+                  <c:v>3.4</c:v>
+                </c:pt>
+              </c:numCache>
+            </c:numRef>
+          </c:val>
+        </c:ser>
+        <c:ser>
+          <c:idx val="1"/>
+          <c:order val="1"/>
+          <c:tx>
+            <c:strRef>
+              <c:f>Sheet1!$C$1</c:f>
+              <c:strCache>
+                <c:ptCount val="1"/>
+                <c:pt idx="0">
+                  <c:v>Series 2</c:v>
+                </c:pt>
+              </c:strCache>
+            </c:strRef>
+          </c:tx>
+          <c:invertIfNegative val="0"/>
+          <c:cat>
+            <c:strRef>
+              <c:f>Sheet1!$A$2:$A$4</c:f>
+              <c:strCache>
+                <c:ptCount val="3"/>
+                <c:pt idx="0">
+                  <c:v>Foo</c:v>
+                </c:pt>
+                <c:pt idx="1">
+                  <c:v>Bar</c:v>
+                </c:pt>
+                <c:pt idx="2">
+                  <c:v>Baz</c:v>
+                </c:pt>
+              </c:strCache>
+            </c:strRef>
+          </c:cat>
+          <c:val>
+            <c:numRef>
+              <c:f>Sheet1!$C$2:$C$4</c:f>
+              <c:numCache>
+                <c:formatCode>General</c:formatCode>
+                <c:ptCount val="3"/>
+                <c:pt idx="0">
+                  <c:v>4.5</c:v>
+                </c:pt>
+                <c:pt idx="1">
+                  <c:v>5.6</c:v>
+                </c:pt>
+                <c:pt idx="2">
+                  <c:v>6.7</c:v>
+                </c:pt>
+              </c:numCache>
+            </c:numRef>
+          </c:val>
+        </c:ser>
+        <c:ser>
+          <c:idx val="2"/>
+          <c:order val="2"/>
+          <c:tx>
+            <c:strRef>
+              <c:f>Sheet1!$D$1</c:f>
+              <c:strCache>
+                <c:ptCount val="1"/>
+                <c:pt idx="0">
+                  <c:v>Series 3</c:v>
+                </c:pt>
+              </c:strCache>
+            </c:strRef>
+          </c:tx>
+          <c:invertIfNegative val="0"/>
+          <c:dLbls>
+            <c:numFmt formatCode="#,##0.0" sourceLinked="0"/>
+            <c:showLegendKey val="0"/>
+            <c:showVal val="1"/>
+            <c:showCatName val="0"/>
+            <c:showSerName val="0"/>
+            <c:showPercent val="0"/>
+            <c:showBubbleSize val="0"/>
+            <c:showLeaderLines val="0"/>
+          </c:dLbls>
+          <c:cat>
+            <c:strRef>
+              <c:f>Sheet1!$A$2:$A$4</c:f>
+              <c:strCache>
+                <c:ptCount val="3"/>
+                <c:pt idx="0">
+                  <c:v>Foo</c:v>
+                </c:pt>
+                <c:pt idx="1">
+                  <c:v>Bar</c:v>
+                </c:pt>
+                <c:pt idx="2">
+                  <c:v>Baz</c:v>
+                </c:pt>
+              </c:strCache>
+            </c:strRef>
+          </c:cat>
+          <c:val>
+            <c:numRef>
+              <c:f>Sheet1!$D$2:$D$4</c:f>
+              <c:numCache>
+                <c:formatCode>General</c:formatCode>
+                <c:ptCount val="3"/>
+                <c:pt idx="0">
+                  <c:v>7.8</c:v>
+                </c:pt>
+                <c:pt idx="1">
+                  <c:v>8.9</c:v>
+                </c:pt>
+                <c:pt idx="2">
+                  <c:v>9.0</c:v>
+                </c:pt>
+              </c:numCache>
+            </c:numRef>
+          </c:val>
+        </c:ser>
+        <c:dLbls>
+          <c:showLegendKey val="0"/>
+          <c:showVal val="1"/>
+          <c:showCatName val="0"/>
+          <c:showSerName val="0"/>
+          <c:showPercent val="0"/>
+          <c:showBubbleSize val="0"/>
+        </c:dLbls>
+        <c:gapWidth val="150"/>
+        <c:axId val="2137932840"/>
+        <c:axId val="2137810696"/>
+      </c:barChart>
+      <c:catAx>
+        <c:axId val="2137932840"/>
+        <c:scaling>
+          <c:orientation val="minMax"/>
+        </c:scaling>
+        <c:delete val="0"/>
+        <c:axPos val="l"/>
+        <c:majorTickMark val="out"/>
+        <c:minorTickMark val="none"/>
+        <c:tickLblPos val="nextTo"/>
+        <c:crossAx val="2137810696"/>
+        <c:crosses val="autoZero"/>
+        <c:auto val="1"/>
+        <c:lblAlgn val="ctr"/>
+        <c:lblOffset val="100"/>
+        <c:noMultiLvlLbl val="0"/>
+      </c:catAx>
+      <c:valAx>
+        <c:axId val="2137810696"/>
+        <c:scaling>
+          <c:orientation val="minMax"/>
+        </c:scaling>
+        <c:delete val="0"/>
+        <c:axPos val="b"/>
+        <c:majorGridlines/>
+        <c:numFmt formatCode="General" sourceLinked="1"/>
+        <c:majorTickMark val="out"/>
+        <c:minorTickMark val="none"/>
+        <c:tickLblPos val="nextTo"/>
+        <c:crossAx val="2137932840"/>
         <c:crosses val="autoZero"/>
         <c:crossBetween val="between"/>
       </c:valAx>
@@ -1026,6 +1283,58 @@
     <p:extLst>
       <p:ext uri="{BB962C8B-B14F-4D97-AF65-F5344CB8AC3E}">
         <p14:creationId xmlns:p14="http://schemas.microsoft.com/office/powerpoint/2010/main" val="1585429260"/>
+      </p:ext>
+    </p:extLst>
+  </p:cSld>
+  <p:clrMapOvr>
+    <a:masterClrMapping/>
+  </p:clrMapOvr>
+</p:sld>
+</file>
+
+<file path=ppt/slides/slide3.xml><?xml version="1.0" encoding="utf-8"?>
+<p:sld xmlns:a="http://schemas.openxmlformats.org/drawingml/2006/main" xmlns:r="http://schemas.openxmlformats.org/officeDocument/2006/relationships" xmlns:p="http://schemas.openxmlformats.org/presentationml/2006/main">
+  <p:cSld>
+    <p:spTree>
+      <p:nvGrpSpPr>
+        <p:cNvPr id="1" name=""/>
+        <p:cNvGrpSpPr/>
+        <p:nvPr/>
+      </p:nvGrpSpPr>
+      <p:grpSpPr>
+        <a:xfrm>
+          <a:off x="0" y="0"/>
+          <a:ext cx="0" cy="0"/>
+          <a:chOff x="0" y="0"/>
+          <a:chExt cx="0" cy="0"/>
+        </a:xfrm>
+      </p:grpSpPr>
+      <p:graphicFrame>
+        <p:nvGraphicFramePr>
+          <p:cNvPr id="2" name="Chart 1"/>
+          <p:cNvGraphicFramePr/>
+          <p:nvPr>
+            <p:extLst>
+              <p:ext uri="{D42A27DB-BD31-4B8C-83A1-F6EECF244321}">
+                <p14:modId xmlns:p14="http://schemas.microsoft.com/office/powerpoint/2010/main" val="2420605178"/>
+              </p:ext>
+            </p:extLst>
+          </p:nvPr>
+        </p:nvGraphicFramePr>
+        <p:xfrm>
+          <a:off x="1524000" y="1397000"/>
+          <a:ext cx="6096000" cy="4064000"/>
+        </p:xfrm>
+        <a:graphic>
+          <a:graphicData uri="http://schemas.openxmlformats.org/drawingml/2006/chart">
+            <c:chart xmlns:c="http://schemas.openxmlformats.org/drawingml/2006/chart" xmlns:r="http://schemas.openxmlformats.org/officeDocument/2006/relationships" r:id="rId2"/>
+          </a:graphicData>
+        </a:graphic>
+      </p:graphicFrame>
+    </p:spTree>
+    <p:extLst>
+      <p:ext uri="{BB962C8B-B14F-4D97-AF65-F5344CB8AC3E}">
+        <p14:creationId xmlns:p14="http://schemas.microsoft.com/office/powerpoint/2010/main" val="3172331618"/>
       </p:ext>
     </p:extLst>
   </p:cSld>

</xml_diff>

<commit_message>
acpt: add scenarios for BubblePlot.bubble_scale
</commit_message>
<xml_diff>
--- a/features/steps/test_files/cht-plot-props.pptx
+++ b/features/steps/test_files/cht-plot-props.pptx
@@ -8,6 +8,8 @@
     <p:sldId id="256" r:id="rId2"/>
     <p:sldId id="257" r:id="rId3"/>
     <p:sldId id="258" r:id="rId4"/>
+    <p:sldId id="259" r:id="rId5"/>
+    <p:sldId id="260" r:id="rId6"/>
   </p:sldIdLst>
   <p:sldSz cx="9144000" cy="6858000" type="screen4x3"/>
   <p:notesSz cx="6858000" cy="9144000"/>
@@ -129,6 +131,7 @@
       <c:barChart>
         <c:barDir val="col"/>
         <c:grouping val="clustered"/>
+        <c:varyColors val="1"/>
         <c:ser>
           <c:idx val="0"/>
           <c:order val="0"/>
@@ -308,11 +311,12 @@
           <c:showPercent val="0"/>
           <c:showBubbleSize val="0"/>
         </c:dLbls>
-        <c:axId val="2020355544"/>
-        <c:axId val="2109826856"/>
+        <c:gapWidth val="150"/>
+        <c:axId val="-2110127752"/>
+        <c:axId val="-2110557112"/>
       </c:barChart>
       <c:catAx>
-        <c:axId val="2020355544"/>
+        <c:axId val="-2110127752"/>
         <c:scaling>
           <c:orientation val="minMax"/>
         </c:scaling>
@@ -321,7 +325,7 @@
         <c:majorTickMark val="out"/>
         <c:minorTickMark val="none"/>
         <c:tickLblPos val="nextTo"/>
-        <c:crossAx val="2109826856"/>
+        <c:crossAx val="-2110557112"/>
         <c:crosses val="autoZero"/>
         <c:auto val="1"/>
         <c:lblAlgn val="ctr"/>
@@ -329,7 +333,7 @@
         <c:noMultiLvlLbl val="0"/>
       </c:catAx>
       <c:valAx>
-        <c:axId val="2109826856"/>
+        <c:axId val="-2110557112"/>
         <c:scaling>
           <c:orientation val="minMax"/>
         </c:scaling>
@@ -340,7 +344,7 @@
         <c:majorTickMark val="out"/>
         <c:minorTickMark val="none"/>
         <c:tickLblPos val="nextTo"/>
-        <c:crossAx val="2020355544"/>
+        <c:crossAx val="-2110127752"/>
         <c:crosses val="autoZero"/>
         <c:crossBetween val="between"/>
       </c:valAx>
@@ -564,11 +568,11 @@
         </c:ser>
         <c:gapWidth val="300"/>
         <c:overlap val="42"/>
-        <c:axId val="2070039208"/>
-        <c:axId val="2070042184"/>
+        <c:axId val="2113896840"/>
+        <c:axId val="-2109943688"/>
       </c:barChart>
       <c:catAx>
-        <c:axId val="2070039208"/>
+        <c:axId val="2113896840"/>
         <c:scaling>
           <c:orientation val="minMax"/>
         </c:scaling>
@@ -577,7 +581,7 @@
         <c:majorTickMark val="out"/>
         <c:minorTickMark val="none"/>
         <c:tickLblPos val="nextTo"/>
-        <c:crossAx val="2070042184"/>
+        <c:crossAx val="-2109943688"/>
         <c:crosses val="autoZero"/>
         <c:auto val="1"/>
         <c:lblAlgn val="ctr"/>
@@ -585,7 +589,7 @@
         <c:noMultiLvlLbl val="0"/>
       </c:catAx>
       <c:valAx>
-        <c:axId val="2070042184"/>
+        <c:axId val="-2109943688"/>
         <c:scaling>
           <c:orientation val="minMax"/>
         </c:scaling>
@@ -596,7 +600,7 @@
         <c:majorTickMark val="out"/>
         <c:minorTickMark val="none"/>
         <c:tickLblPos val="nextTo"/>
-        <c:crossAx val="2070039208"/>
+        <c:crossAx val="2113896840"/>
         <c:crosses val="autoZero"/>
         <c:crossBetween val="between"/>
       </c:valAx>
@@ -820,11 +824,11 @@
         </c:dLbls>
         <c:gapWidth val="150"/>
         <c:overlap val="-42"/>
-        <c:axId val="2137932840"/>
-        <c:axId val="2137810696"/>
+        <c:axId val="-2108833576"/>
+        <c:axId val="-2109714648"/>
       </c:barChart>
       <c:catAx>
-        <c:axId val="2137932840"/>
+        <c:axId val="-2108833576"/>
         <c:scaling>
           <c:orientation val="minMax"/>
         </c:scaling>
@@ -833,7 +837,7 @@
         <c:majorTickMark val="out"/>
         <c:minorTickMark val="none"/>
         <c:tickLblPos val="nextTo"/>
-        <c:crossAx val="2137810696"/>
+        <c:crossAx val="-2109714648"/>
         <c:crosses val="autoZero"/>
         <c:auto val="1"/>
         <c:lblAlgn val="ctr"/>
@@ -841,7 +845,7 @@
         <c:noMultiLvlLbl val="0"/>
       </c:catAx>
       <c:valAx>
-        <c:axId val="2137810696"/>
+        <c:axId val="-2109714648"/>
         <c:scaling>
           <c:orientation val="minMax"/>
         </c:scaling>
@@ -852,9 +856,337 @@
         <c:majorTickMark val="out"/>
         <c:minorTickMark val="none"/>
         <c:tickLblPos val="nextTo"/>
-        <c:crossAx val="2137932840"/>
+        <c:crossAx val="-2108833576"/>
         <c:crosses val="autoZero"/>
         <c:crossBetween val="between"/>
+      </c:valAx>
+    </c:plotArea>
+    <c:legend>
+      <c:legendPos val="r"/>
+      <c:layout/>
+      <c:overlay val="0"/>
+    </c:legend>
+    <c:plotVisOnly val="1"/>
+    <c:dispBlanksAs val="gap"/>
+    <c:showDLblsOverMax val="0"/>
+  </c:chart>
+  <c:txPr>
+    <a:bodyPr/>
+    <a:lstStyle/>
+    <a:p>
+      <a:pPr>
+        <a:defRPr sz="1800"/>
+      </a:pPr>
+      <a:endParaRPr lang="en-US"/>
+    </a:p>
+  </c:txPr>
+  <c:externalData r:id="rId1">
+    <c:autoUpdate val="0"/>
+  </c:externalData>
+</c:chartSpace>
+</file>
+
+<file path=ppt/charts/chart4.xml><?xml version="1.0" encoding="utf-8"?>
+<c:chartSpace xmlns:c="http://schemas.openxmlformats.org/drawingml/2006/chart" xmlns:a="http://schemas.openxmlformats.org/drawingml/2006/main" xmlns:r="http://schemas.openxmlformats.org/officeDocument/2006/relationships">
+  <c:date1904 val="0"/>
+  <c:lang val="en-US"/>
+  <c:roundedCorners val="0"/>
+  <mc:AlternateContent xmlns:mc="http://schemas.openxmlformats.org/markup-compatibility/2006">
+    <mc:Choice xmlns:c14="http://schemas.microsoft.com/office/drawing/2007/8/2/chart" Requires="c14">
+      <c14:style val="118"/>
+    </mc:Choice>
+    <mc:Fallback>
+      <c:style val="18"/>
+    </mc:Fallback>
+  </mc:AlternateContent>
+  <c:chart>
+    <c:title>
+      <c:layout/>
+      <c:overlay val="0"/>
+    </c:title>
+    <c:autoTitleDeleted val="0"/>
+    <c:plotArea>
+      <c:layout/>
+      <c:bubbleChart>
+        <c:varyColors val="0"/>
+        <c:ser>
+          <c:idx val="0"/>
+          <c:order val="0"/>
+          <c:tx>
+            <c:strRef>
+              <c:f>Sheet1!$B$1</c:f>
+              <c:strCache>
+                <c:ptCount val="1"/>
+                <c:pt idx="0">
+                  <c:v>Y-Value 1</c:v>
+                </c:pt>
+              </c:strCache>
+            </c:strRef>
+          </c:tx>
+          <c:invertIfNegative val="0"/>
+          <c:xVal>
+            <c:numRef>
+              <c:f>Sheet1!$A$2:$A$4</c:f>
+              <c:numCache>
+                <c:formatCode>General</c:formatCode>
+                <c:ptCount val="3"/>
+                <c:pt idx="0">
+                  <c:v>0.7</c:v>
+                </c:pt>
+                <c:pt idx="1">
+                  <c:v>1.8</c:v>
+                </c:pt>
+                <c:pt idx="2">
+                  <c:v>2.6</c:v>
+                </c:pt>
+              </c:numCache>
+            </c:numRef>
+          </c:xVal>
+          <c:yVal>
+            <c:numRef>
+              <c:f>Sheet1!$B$2:$B$4</c:f>
+              <c:numCache>
+                <c:formatCode>General</c:formatCode>
+                <c:ptCount val="3"/>
+                <c:pt idx="0">
+                  <c:v>2.7</c:v>
+                </c:pt>
+                <c:pt idx="1">
+                  <c:v>3.2</c:v>
+                </c:pt>
+                <c:pt idx="2">
+                  <c:v>0.8</c:v>
+                </c:pt>
+              </c:numCache>
+            </c:numRef>
+          </c:yVal>
+          <c:bubbleSize>
+            <c:numRef>
+              <c:f>Sheet1!$C$2:$C$4</c:f>
+              <c:numCache>
+                <c:formatCode>General</c:formatCode>
+                <c:ptCount val="3"/>
+                <c:pt idx="0">
+                  <c:v>10.0</c:v>
+                </c:pt>
+                <c:pt idx="1">
+                  <c:v>4.0</c:v>
+                </c:pt>
+                <c:pt idx="2">
+                  <c:v>8.0</c:v>
+                </c:pt>
+              </c:numCache>
+            </c:numRef>
+          </c:bubbleSize>
+          <c:bubble3D val="0"/>
+        </c:ser>
+        <c:dLbls>
+          <c:showLegendKey val="0"/>
+          <c:showVal val="0"/>
+          <c:showCatName val="0"/>
+          <c:showSerName val="0"/>
+          <c:showPercent val="0"/>
+          <c:showBubbleSize val="0"/>
+        </c:dLbls>
+        <c:bubbleScale val="100"/>
+        <c:showNegBubbles val="0"/>
+        <c:axId val="-2109468456"/>
+        <c:axId val="-2105837592"/>
+      </c:bubbleChart>
+      <c:valAx>
+        <c:axId val="-2109468456"/>
+        <c:scaling>
+          <c:orientation val="minMax"/>
+        </c:scaling>
+        <c:delete val="0"/>
+        <c:axPos val="b"/>
+        <c:numFmt formatCode="General" sourceLinked="1"/>
+        <c:majorTickMark val="out"/>
+        <c:minorTickMark val="none"/>
+        <c:tickLblPos val="nextTo"/>
+        <c:crossAx val="-2105837592"/>
+        <c:crosses val="autoZero"/>
+        <c:crossBetween val="midCat"/>
+      </c:valAx>
+      <c:valAx>
+        <c:axId val="-2105837592"/>
+        <c:scaling>
+          <c:orientation val="minMax"/>
+        </c:scaling>
+        <c:delete val="0"/>
+        <c:axPos val="l"/>
+        <c:majorGridlines/>
+        <c:numFmt formatCode="General" sourceLinked="1"/>
+        <c:majorTickMark val="out"/>
+        <c:minorTickMark val="none"/>
+        <c:tickLblPos val="nextTo"/>
+        <c:crossAx val="-2109468456"/>
+        <c:crosses val="autoZero"/>
+        <c:crossBetween val="midCat"/>
+      </c:valAx>
+    </c:plotArea>
+    <c:legend>
+      <c:legendPos val="r"/>
+      <c:layout/>
+      <c:overlay val="0"/>
+    </c:legend>
+    <c:plotVisOnly val="1"/>
+    <c:dispBlanksAs val="gap"/>
+    <c:showDLblsOverMax val="0"/>
+  </c:chart>
+  <c:txPr>
+    <a:bodyPr/>
+    <a:lstStyle/>
+    <a:p>
+      <a:pPr>
+        <a:defRPr sz="1800"/>
+      </a:pPr>
+      <a:endParaRPr lang="en-US"/>
+    </a:p>
+  </c:txPr>
+  <c:externalData r:id="rId1">
+    <c:autoUpdate val="0"/>
+  </c:externalData>
+</c:chartSpace>
+</file>
+
+<file path=ppt/charts/chart5.xml><?xml version="1.0" encoding="utf-8"?>
+<c:chartSpace xmlns:c="http://schemas.openxmlformats.org/drawingml/2006/chart" xmlns:a="http://schemas.openxmlformats.org/drawingml/2006/main" xmlns:r="http://schemas.openxmlformats.org/officeDocument/2006/relationships">
+  <c:date1904 val="0"/>
+  <c:lang val="en-US"/>
+  <c:roundedCorners val="0"/>
+  <mc:AlternateContent xmlns:mc="http://schemas.openxmlformats.org/markup-compatibility/2006">
+    <mc:Choice xmlns:c14="http://schemas.microsoft.com/office/drawing/2007/8/2/chart" Requires="c14">
+      <c14:style val="118"/>
+    </mc:Choice>
+    <mc:Fallback>
+      <c:style val="18"/>
+    </mc:Fallback>
+  </mc:AlternateContent>
+  <c:chart>
+    <c:title>
+      <c:layout/>
+      <c:overlay val="0"/>
+    </c:title>
+    <c:autoTitleDeleted val="0"/>
+    <c:plotArea>
+      <c:layout/>
+      <c:bubbleChart>
+        <c:varyColors val="0"/>
+        <c:ser>
+          <c:idx val="0"/>
+          <c:order val="0"/>
+          <c:tx>
+            <c:strRef>
+              <c:f>Sheet1!$B$1</c:f>
+              <c:strCache>
+                <c:ptCount val="1"/>
+                <c:pt idx="0">
+                  <c:v>Y-Value 1</c:v>
+                </c:pt>
+              </c:strCache>
+            </c:strRef>
+          </c:tx>
+          <c:invertIfNegative val="0"/>
+          <c:xVal>
+            <c:numRef>
+              <c:f>Sheet1!$A$2:$A$4</c:f>
+              <c:numCache>
+                <c:formatCode>General</c:formatCode>
+                <c:ptCount val="3"/>
+                <c:pt idx="0">
+                  <c:v>0.7</c:v>
+                </c:pt>
+                <c:pt idx="1">
+                  <c:v>1.8</c:v>
+                </c:pt>
+                <c:pt idx="2">
+                  <c:v>2.6</c:v>
+                </c:pt>
+              </c:numCache>
+            </c:numRef>
+          </c:xVal>
+          <c:yVal>
+            <c:numRef>
+              <c:f>Sheet1!$B$2:$B$4</c:f>
+              <c:numCache>
+                <c:formatCode>General</c:formatCode>
+                <c:ptCount val="3"/>
+                <c:pt idx="0">
+                  <c:v>2.7</c:v>
+                </c:pt>
+                <c:pt idx="1">
+                  <c:v>3.2</c:v>
+                </c:pt>
+                <c:pt idx="2">
+                  <c:v>0.8</c:v>
+                </c:pt>
+              </c:numCache>
+            </c:numRef>
+          </c:yVal>
+          <c:bubbleSize>
+            <c:numRef>
+              <c:f>Sheet1!$C$2:$C$4</c:f>
+              <c:numCache>
+                <c:formatCode>General</c:formatCode>
+                <c:ptCount val="3"/>
+                <c:pt idx="0">
+                  <c:v>10.0</c:v>
+                </c:pt>
+                <c:pt idx="1">
+                  <c:v>4.0</c:v>
+                </c:pt>
+                <c:pt idx="2">
+                  <c:v>8.0</c:v>
+                </c:pt>
+              </c:numCache>
+            </c:numRef>
+          </c:bubbleSize>
+          <c:bubble3D val="1"/>
+        </c:ser>
+        <c:dLbls>
+          <c:showLegendKey val="0"/>
+          <c:showVal val="0"/>
+          <c:showCatName val="0"/>
+          <c:showSerName val="0"/>
+          <c:showPercent val="0"/>
+          <c:showBubbleSize val="0"/>
+        </c:dLbls>
+        <c:bubbleScale val="70"/>
+        <c:showNegBubbles val="0"/>
+        <c:axId val="-2110529576"/>
+        <c:axId val="-2110534088"/>
+      </c:bubbleChart>
+      <c:valAx>
+        <c:axId val="-2110529576"/>
+        <c:scaling>
+          <c:orientation val="minMax"/>
+        </c:scaling>
+        <c:delete val="0"/>
+        <c:axPos val="b"/>
+        <c:numFmt formatCode="General" sourceLinked="1"/>
+        <c:majorTickMark val="out"/>
+        <c:minorTickMark val="none"/>
+        <c:tickLblPos val="nextTo"/>
+        <c:crossAx val="-2110534088"/>
+        <c:crosses val="autoZero"/>
+        <c:crossBetween val="midCat"/>
+      </c:valAx>
+      <c:valAx>
+        <c:axId val="-2110534088"/>
+        <c:scaling>
+          <c:orientation val="minMax"/>
+        </c:scaling>
+        <c:delete val="0"/>
+        <c:axPos val="l"/>
+        <c:majorGridlines/>
+        <c:numFmt formatCode="General" sourceLinked="1"/>
+        <c:majorTickMark val="out"/>
+        <c:minorTickMark val="none"/>
+        <c:tickLblPos val="nextTo"/>
+        <c:crossAx val="-2110529576"/>
+        <c:crosses val="autoZero"/>
+        <c:crossBetween val="midCat"/>
       </c:valAx>
     </c:plotArea>
     <c:legend>
@@ -1335,6 +1667,110 @@
     <p:extLst>
       <p:ext uri="{BB962C8B-B14F-4D97-AF65-F5344CB8AC3E}">
         <p14:creationId xmlns:p14="http://schemas.microsoft.com/office/powerpoint/2010/main" val="3172331618"/>
+      </p:ext>
+    </p:extLst>
+  </p:cSld>
+  <p:clrMapOvr>
+    <a:masterClrMapping/>
+  </p:clrMapOvr>
+</p:sld>
+</file>
+
+<file path=ppt/slides/slide4.xml><?xml version="1.0" encoding="utf-8"?>
+<p:sld xmlns:a="http://schemas.openxmlformats.org/drawingml/2006/main" xmlns:r="http://schemas.openxmlformats.org/officeDocument/2006/relationships" xmlns:p="http://schemas.openxmlformats.org/presentationml/2006/main">
+  <p:cSld>
+    <p:spTree>
+      <p:nvGrpSpPr>
+        <p:cNvPr id="1" name=""/>
+        <p:cNvGrpSpPr/>
+        <p:nvPr/>
+      </p:nvGrpSpPr>
+      <p:grpSpPr>
+        <a:xfrm>
+          <a:off x="0" y="0"/>
+          <a:ext cx="0" cy="0"/>
+          <a:chOff x="0" y="0"/>
+          <a:chExt cx="0" cy="0"/>
+        </a:xfrm>
+      </p:grpSpPr>
+      <p:graphicFrame>
+        <p:nvGraphicFramePr>
+          <p:cNvPr id="2" name="Chart 1"/>
+          <p:cNvGraphicFramePr/>
+          <p:nvPr>
+            <p:extLst>
+              <p:ext uri="{D42A27DB-BD31-4B8C-83A1-F6EECF244321}">
+                <p14:modId xmlns:p14="http://schemas.microsoft.com/office/powerpoint/2010/main" val="931531353"/>
+              </p:ext>
+            </p:extLst>
+          </p:nvPr>
+        </p:nvGraphicFramePr>
+        <p:xfrm>
+          <a:off x="1524000" y="1397000"/>
+          <a:ext cx="6096000" cy="4064000"/>
+        </p:xfrm>
+        <a:graphic>
+          <a:graphicData uri="http://schemas.openxmlformats.org/drawingml/2006/chart">
+            <c:chart xmlns:c="http://schemas.openxmlformats.org/drawingml/2006/chart" xmlns:r="http://schemas.openxmlformats.org/officeDocument/2006/relationships" r:id="rId2"/>
+          </a:graphicData>
+        </a:graphic>
+      </p:graphicFrame>
+    </p:spTree>
+    <p:extLst>
+      <p:ext uri="{BB962C8B-B14F-4D97-AF65-F5344CB8AC3E}">
+        <p14:creationId xmlns:p14="http://schemas.microsoft.com/office/powerpoint/2010/main" val="4133152676"/>
+      </p:ext>
+    </p:extLst>
+  </p:cSld>
+  <p:clrMapOvr>
+    <a:masterClrMapping/>
+  </p:clrMapOvr>
+</p:sld>
+</file>
+
+<file path=ppt/slides/slide5.xml><?xml version="1.0" encoding="utf-8"?>
+<p:sld xmlns:a="http://schemas.openxmlformats.org/drawingml/2006/main" xmlns:r="http://schemas.openxmlformats.org/officeDocument/2006/relationships" xmlns:p="http://schemas.openxmlformats.org/presentationml/2006/main">
+  <p:cSld>
+    <p:spTree>
+      <p:nvGrpSpPr>
+        <p:cNvPr id="1" name=""/>
+        <p:cNvGrpSpPr/>
+        <p:nvPr/>
+      </p:nvGrpSpPr>
+      <p:grpSpPr>
+        <a:xfrm>
+          <a:off x="0" y="0"/>
+          <a:ext cx="0" cy="0"/>
+          <a:chOff x="0" y="0"/>
+          <a:chExt cx="0" cy="0"/>
+        </a:xfrm>
+      </p:grpSpPr>
+      <p:graphicFrame>
+        <p:nvGraphicFramePr>
+          <p:cNvPr id="2" name="Chart 1"/>
+          <p:cNvGraphicFramePr/>
+          <p:nvPr>
+            <p:extLst>
+              <p:ext uri="{D42A27DB-BD31-4B8C-83A1-F6EECF244321}">
+                <p14:modId xmlns:p14="http://schemas.microsoft.com/office/powerpoint/2010/main" val="2028561214"/>
+              </p:ext>
+            </p:extLst>
+          </p:nvPr>
+        </p:nvGraphicFramePr>
+        <p:xfrm>
+          <a:off x="1524000" y="1397000"/>
+          <a:ext cx="6096000" cy="4064000"/>
+        </p:xfrm>
+        <a:graphic>
+          <a:graphicData uri="http://schemas.openxmlformats.org/drawingml/2006/chart">
+            <c:chart xmlns:c="http://schemas.openxmlformats.org/drawingml/2006/chart" xmlns:r="http://schemas.openxmlformats.org/officeDocument/2006/relationships" r:id="rId2"/>
+          </a:graphicData>
+        </a:graphic>
+      </p:graphicFrame>
+    </p:spTree>
+    <p:extLst>
+      <p:ext uri="{BB962C8B-B14F-4D97-AF65-F5344CB8AC3E}">
+        <p14:creationId xmlns:p14="http://schemas.microsoft.com/office/powerpoint/2010/main" val="3357144560"/>
       </p:ext>
     </p:extLst>
   </p:cSld>

</xml_diff>